<commit_message>
acpt: add scenario for Categories.depth
</commit_message>
<xml_diff>
--- a/features/steps/test_files/cht-category-access.pptx
+++ b/features/steps/test_files/cht-category-access.pptx
@@ -7,6 +7,8 @@
   <p:sldIdLst>
     <p:sldId id="256" r:id="rId2"/>
     <p:sldId id="257" r:id="rId3"/>
+    <p:sldId id="258" r:id="rId4"/>
+    <p:sldId id="259" r:id="rId5"/>
   </p:sldIdLst>
   <p:sldSz cx="9144000" cy="6858000" type="screen4x3"/>
   <p:notesSz cx="6858000" cy="9144000"/>
@@ -751,6 +753,392 @@
 </c:chartSpace>
 </file>
 
+<file path=ppt/charts/chart3.xml><?xml version="1.0" encoding="utf-8"?>
+<c:chartSpace xmlns:c="http://schemas.openxmlformats.org/drawingml/2006/chart" xmlns:a="http://schemas.openxmlformats.org/drawingml/2006/main" xmlns:r="http://schemas.openxmlformats.org/officeDocument/2006/relationships">
+  <c:date1904 val="0"/>
+  <c:lang val="en-US"/>
+  <c:roundedCorners val="0"/>
+  <mc:AlternateContent xmlns:mc="http://schemas.openxmlformats.org/markup-compatibility/2006">
+    <mc:Choice xmlns:c14="http://schemas.microsoft.com/office/drawing/2007/8/2/chart" Requires="c14">
+      <c14:style val="118"/>
+    </mc:Choice>
+    <mc:Fallback>
+      <c:style val="18"/>
+    </mc:Fallback>
+  </mc:AlternateContent>
+  <c:chart>
+    <c:autoTitleDeleted val="0"/>
+    <c:plotArea>
+      <c:layout/>
+      <c:barChart>
+        <c:barDir val="col"/>
+        <c:grouping val="clustered"/>
+        <c:varyColors val="0"/>
+        <c:dLbls>
+          <c:showLegendKey val="0"/>
+          <c:showVal val="0"/>
+          <c:showCatName val="0"/>
+          <c:showSerName val="0"/>
+          <c:showPercent val="0"/>
+          <c:showBubbleSize val="0"/>
+        </c:dLbls>
+        <c:gapWidth val="150"/>
+        <c:axId val="-2073711928"/>
+        <c:axId val="-2073186984"/>
+      </c:barChart>
+      <c:catAx>
+        <c:axId val="-2073711928"/>
+        <c:scaling>
+          <c:orientation val="minMax"/>
+        </c:scaling>
+        <c:delete val="0"/>
+        <c:axPos val="b"/>
+        <c:numFmt formatCode="General" sourceLinked="1"/>
+        <c:majorTickMark val="out"/>
+        <c:minorTickMark val="none"/>
+        <c:tickLblPos val="nextTo"/>
+        <c:crossAx val="-2073186984"/>
+        <c:crosses val="autoZero"/>
+        <c:auto val="1"/>
+        <c:lblAlgn val="ctr"/>
+        <c:lblOffset val="100"/>
+        <c:noMultiLvlLbl val="0"/>
+      </c:catAx>
+      <c:valAx>
+        <c:axId val="-2073186984"/>
+        <c:scaling>
+          <c:orientation val="minMax"/>
+        </c:scaling>
+        <c:delete val="0"/>
+        <c:axPos val="l"/>
+        <c:majorGridlines/>
+        <c:numFmt formatCode="General" sourceLinked="1"/>
+        <c:majorTickMark val="out"/>
+        <c:minorTickMark val="none"/>
+        <c:tickLblPos val="nextTo"/>
+        <c:crossAx val="-2073711928"/>
+        <c:crosses val="autoZero"/>
+        <c:crossBetween val="between"/>
+      </c:valAx>
+    </c:plotArea>
+    <c:legend>
+      <c:legendPos val="r"/>
+      <c:layout/>
+      <c:overlay val="0"/>
+    </c:legend>
+    <c:plotVisOnly val="1"/>
+    <c:dispBlanksAs val="gap"/>
+    <c:showDLblsOverMax val="0"/>
+  </c:chart>
+  <c:txPr>
+    <a:bodyPr/>
+    <a:lstStyle/>
+    <a:p>
+      <a:pPr>
+        <a:defRPr sz="1800"/>
+      </a:pPr>
+      <a:endParaRPr lang="en-US"/>
+    </a:p>
+  </c:txPr>
+  <c:externalData r:id="rId1">
+    <c:autoUpdate val="0"/>
+  </c:externalData>
+</c:chartSpace>
+</file>
+
+<file path=ppt/charts/chart4.xml><?xml version="1.0" encoding="utf-8"?>
+<c:chartSpace xmlns:c="http://schemas.openxmlformats.org/drawingml/2006/chart" xmlns:a="http://schemas.openxmlformats.org/drawingml/2006/main" xmlns:r="http://schemas.openxmlformats.org/officeDocument/2006/relationships">
+  <c:date1904 val="0"/>
+  <c:lang val="en-US"/>
+  <c:roundedCorners val="0"/>
+  <mc:AlternateContent xmlns:mc="http://schemas.openxmlformats.org/markup-compatibility/2006">
+    <mc:Choice xmlns:c14="http://schemas.microsoft.com/office/drawing/2007/8/2/chart" Requires="c14">
+      <c14:style val="118"/>
+    </mc:Choice>
+    <mc:Fallback>
+      <c:style val="18"/>
+    </mc:Fallback>
+  </mc:AlternateContent>
+  <c:chart>
+    <c:autoTitleDeleted val="0"/>
+    <c:plotArea>
+      <c:layout/>
+      <c:barChart>
+        <c:barDir val="col"/>
+        <c:grouping val="clustered"/>
+        <c:varyColors val="0"/>
+        <c:ser>
+          <c:idx val="2"/>
+          <c:order val="0"/>
+          <c:tx>
+            <c:strRef>
+              <c:f>Sheet1!$C$1</c:f>
+              <c:strCache>
+                <c:ptCount val="1"/>
+                <c:pt idx="0">
+                  <c:v>Series 1</c:v>
+                </c:pt>
+              </c:strCache>
+            </c:strRef>
+          </c:tx>
+          <c:invertIfNegative val="0"/>
+          <c:cat>
+            <c:multiLvlStrRef>
+              <c:f>Sheet1!$A$2:$B$5</c:f>
+              <c:multiLvlStrCache>
+                <c:ptCount val="4"/>
+                <c:lvl>
+                  <c:pt idx="0">
+                    <c:v>SF</c:v>
+                  </c:pt>
+                  <c:pt idx="1">
+                    <c:v>LA</c:v>
+                  </c:pt>
+                  <c:pt idx="2">
+                    <c:v>NY</c:v>
+                  </c:pt>
+                  <c:pt idx="3">
+                    <c:v>Albany</c:v>
+                  </c:pt>
+                </c:lvl>
+                <c:lvl>
+                  <c:pt idx="0">
+                    <c:v>CA</c:v>
+                  </c:pt>
+                  <c:pt idx="2">
+                    <c:v>NY</c:v>
+                  </c:pt>
+                </c:lvl>
+              </c:multiLvlStrCache>
+            </c:multiLvlStrRef>
+          </c:cat>
+          <c:val>
+            <c:numRef>
+              <c:f>Sheet1!$C$2:$C$5</c:f>
+              <c:numCache>
+                <c:formatCode>General</c:formatCode>
+                <c:ptCount val="4"/>
+                <c:pt idx="0">
+                  <c:v>4.3</c:v>
+                </c:pt>
+                <c:pt idx="1">
+                  <c:v>2.5</c:v>
+                </c:pt>
+                <c:pt idx="2">
+                  <c:v>3.5</c:v>
+                </c:pt>
+                <c:pt idx="3">
+                  <c:v>4.5</c:v>
+                </c:pt>
+              </c:numCache>
+            </c:numRef>
+          </c:val>
+        </c:ser>
+        <c:ser>
+          <c:idx val="3"/>
+          <c:order val="1"/>
+          <c:tx>
+            <c:strRef>
+              <c:f>Sheet1!$D$1</c:f>
+              <c:strCache>
+                <c:ptCount val="1"/>
+                <c:pt idx="0">
+                  <c:v>Series 2</c:v>
+                </c:pt>
+              </c:strCache>
+            </c:strRef>
+          </c:tx>
+          <c:invertIfNegative val="0"/>
+          <c:cat>
+            <c:multiLvlStrRef>
+              <c:f>Sheet1!$A$2:$B$5</c:f>
+              <c:multiLvlStrCache>
+                <c:ptCount val="4"/>
+                <c:lvl>
+                  <c:pt idx="0">
+                    <c:v>SF</c:v>
+                  </c:pt>
+                  <c:pt idx="1">
+                    <c:v>LA</c:v>
+                  </c:pt>
+                  <c:pt idx="2">
+                    <c:v>NY</c:v>
+                  </c:pt>
+                  <c:pt idx="3">
+                    <c:v>Albany</c:v>
+                  </c:pt>
+                </c:lvl>
+                <c:lvl>
+                  <c:pt idx="0">
+                    <c:v>CA</c:v>
+                  </c:pt>
+                  <c:pt idx="2">
+                    <c:v>NY</c:v>
+                  </c:pt>
+                </c:lvl>
+              </c:multiLvlStrCache>
+            </c:multiLvlStrRef>
+          </c:cat>
+          <c:val>
+            <c:numRef>
+              <c:f>Sheet1!$D$2:$D$5</c:f>
+              <c:numCache>
+                <c:formatCode>General</c:formatCode>
+                <c:ptCount val="4"/>
+                <c:pt idx="0">
+                  <c:v>2.4</c:v>
+                </c:pt>
+                <c:pt idx="1">
+                  <c:v>4.4</c:v>
+                </c:pt>
+                <c:pt idx="2">
+                  <c:v>1.8</c:v>
+                </c:pt>
+                <c:pt idx="3">
+                  <c:v>2.8</c:v>
+                </c:pt>
+              </c:numCache>
+            </c:numRef>
+          </c:val>
+        </c:ser>
+        <c:ser>
+          <c:idx val="0"/>
+          <c:order val="2"/>
+          <c:tx>
+            <c:strRef>
+              <c:f>Sheet1!$E$1</c:f>
+              <c:strCache>
+                <c:ptCount val="1"/>
+                <c:pt idx="0">
+                  <c:v>Series 3</c:v>
+                </c:pt>
+              </c:strCache>
+            </c:strRef>
+          </c:tx>
+          <c:invertIfNegative val="0"/>
+          <c:cat>
+            <c:multiLvlStrRef>
+              <c:f>Sheet1!$A$2:$B$5</c:f>
+              <c:multiLvlStrCache>
+                <c:ptCount val="4"/>
+                <c:lvl>
+                  <c:pt idx="0">
+                    <c:v>SF</c:v>
+                  </c:pt>
+                  <c:pt idx="1">
+                    <c:v>LA</c:v>
+                  </c:pt>
+                  <c:pt idx="2">
+                    <c:v>NY</c:v>
+                  </c:pt>
+                  <c:pt idx="3">
+                    <c:v>Albany</c:v>
+                  </c:pt>
+                </c:lvl>
+                <c:lvl>
+                  <c:pt idx="0">
+                    <c:v>CA</c:v>
+                  </c:pt>
+                  <c:pt idx="2">
+                    <c:v>NY</c:v>
+                  </c:pt>
+                </c:lvl>
+              </c:multiLvlStrCache>
+            </c:multiLvlStrRef>
+          </c:cat>
+          <c:val>
+            <c:numRef>
+              <c:f>Sheet1!$E$2:$E$5</c:f>
+              <c:numCache>
+                <c:formatCode>General</c:formatCode>
+                <c:ptCount val="4"/>
+                <c:pt idx="0">
+                  <c:v>2.0</c:v>
+                </c:pt>
+                <c:pt idx="1">
+                  <c:v>2.0</c:v>
+                </c:pt>
+                <c:pt idx="2">
+                  <c:v>3.0</c:v>
+                </c:pt>
+                <c:pt idx="3">
+                  <c:v>5.0</c:v>
+                </c:pt>
+              </c:numCache>
+            </c:numRef>
+          </c:val>
+        </c:ser>
+        <c:dLbls>
+          <c:showLegendKey val="0"/>
+          <c:showVal val="0"/>
+          <c:showCatName val="0"/>
+          <c:showSerName val="0"/>
+          <c:showPercent val="0"/>
+          <c:showBubbleSize val="0"/>
+        </c:dLbls>
+        <c:gapWidth val="150"/>
+        <c:axId val="-2081749672"/>
+        <c:axId val="-2073736552"/>
+      </c:barChart>
+      <c:catAx>
+        <c:axId val="-2081749672"/>
+        <c:scaling>
+          <c:orientation val="minMax"/>
+        </c:scaling>
+        <c:delete val="0"/>
+        <c:axPos val="b"/>
+        <c:majorTickMark val="out"/>
+        <c:minorTickMark val="none"/>
+        <c:tickLblPos val="nextTo"/>
+        <c:crossAx val="-2073736552"/>
+        <c:crosses val="autoZero"/>
+        <c:auto val="1"/>
+        <c:lblAlgn val="ctr"/>
+        <c:lblOffset val="100"/>
+        <c:noMultiLvlLbl val="0"/>
+      </c:catAx>
+      <c:valAx>
+        <c:axId val="-2073736552"/>
+        <c:scaling>
+          <c:orientation val="minMax"/>
+        </c:scaling>
+        <c:delete val="0"/>
+        <c:axPos val="l"/>
+        <c:majorGridlines/>
+        <c:numFmt formatCode="General" sourceLinked="1"/>
+        <c:majorTickMark val="out"/>
+        <c:minorTickMark val="none"/>
+        <c:tickLblPos val="nextTo"/>
+        <c:crossAx val="-2081749672"/>
+        <c:crosses val="autoZero"/>
+        <c:crossBetween val="between"/>
+      </c:valAx>
+    </c:plotArea>
+    <c:legend>
+      <c:legendPos val="r"/>
+      <c:layout/>
+      <c:overlay val="0"/>
+    </c:legend>
+    <c:plotVisOnly val="1"/>
+    <c:dispBlanksAs val="gap"/>
+    <c:showDLblsOverMax val="0"/>
+  </c:chart>
+  <c:txPr>
+    <a:bodyPr/>
+    <a:lstStyle/>
+    <a:p>
+      <a:pPr>
+        <a:defRPr sz="1800"/>
+      </a:pPr>
+      <a:endParaRPr lang="en-US"/>
+    </a:p>
+  </c:txPr>
+  <c:externalData r:id="rId1">
+    <c:autoUpdate val="0"/>
+  </c:externalData>
+</c:chartSpace>
+</file>
+
 <file path=ppt/slideLayouts/slideLayout1.xml><?xml version="1.0" encoding="utf-8"?>
 <p:sldLayout xmlns:a="http://schemas.openxmlformats.org/drawingml/2006/main" xmlns:r="http://schemas.openxmlformats.org/officeDocument/2006/relationships" xmlns:p="http://schemas.openxmlformats.org/presentationml/2006/main" type="blank" preserve="1">
   <p:cSld name="Blank">
@@ -1152,6 +1540,110 @@
     <p:extLst>
       <p:ext uri="{BB962C8B-B14F-4D97-AF65-F5344CB8AC3E}">
         <p14:creationId xmlns:p14="http://schemas.microsoft.com/office/powerpoint/2010/main" val="1795854869"/>
+      </p:ext>
+    </p:extLst>
+  </p:cSld>
+  <p:clrMapOvr>
+    <a:masterClrMapping/>
+  </p:clrMapOvr>
+</p:sld>
+</file>
+
+<file path=ppt/slides/slide3.xml><?xml version="1.0" encoding="utf-8"?>
+<p:sld xmlns:a="http://schemas.openxmlformats.org/drawingml/2006/main" xmlns:r="http://schemas.openxmlformats.org/officeDocument/2006/relationships" xmlns:p="http://schemas.openxmlformats.org/presentationml/2006/main">
+  <p:cSld>
+    <p:spTree>
+      <p:nvGrpSpPr>
+        <p:cNvPr id="1" name=""/>
+        <p:cNvGrpSpPr/>
+        <p:nvPr/>
+      </p:nvGrpSpPr>
+      <p:grpSpPr>
+        <a:xfrm>
+          <a:off x="0" y="0"/>
+          <a:ext cx="0" cy="0"/>
+          <a:chOff x="0" y="0"/>
+          <a:chExt cx="0" cy="0"/>
+        </a:xfrm>
+      </p:grpSpPr>
+      <p:graphicFrame>
+        <p:nvGraphicFramePr>
+          <p:cNvPr id="2" name="Chart 1"/>
+          <p:cNvGraphicFramePr/>
+          <p:nvPr>
+            <p:extLst>
+              <p:ext uri="{D42A27DB-BD31-4B8C-83A1-F6EECF244321}">
+                <p14:modId xmlns:p14="http://schemas.microsoft.com/office/powerpoint/2010/main" val="3795980794"/>
+              </p:ext>
+            </p:extLst>
+          </p:nvPr>
+        </p:nvGraphicFramePr>
+        <p:xfrm>
+          <a:off x="1524000" y="1397000"/>
+          <a:ext cx="6096000" cy="4064000"/>
+        </p:xfrm>
+        <a:graphic>
+          <a:graphicData uri="http://schemas.openxmlformats.org/drawingml/2006/chart">
+            <c:chart xmlns:c="http://schemas.openxmlformats.org/drawingml/2006/chart" xmlns:r="http://schemas.openxmlformats.org/officeDocument/2006/relationships" r:id="rId2"/>
+          </a:graphicData>
+        </a:graphic>
+      </p:graphicFrame>
+    </p:spTree>
+    <p:extLst>
+      <p:ext uri="{BB962C8B-B14F-4D97-AF65-F5344CB8AC3E}">
+        <p14:creationId xmlns:p14="http://schemas.microsoft.com/office/powerpoint/2010/main" val="1989551321"/>
+      </p:ext>
+    </p:extLst>
+  </p:cSld>
+  <p:clrMapOvr>
+    <a:masterClrMapping/>
+  </p:clrMapOvr>
+</p:sld>
+</file>
+
+<file path=ppt/slides/slide4.xml><?xml version="1.0" encoding="utf-8"?>
+<p:sld xmlns:a="http://schemas.openxmlformats.org/drawingml/2006/main" xmlns:r="http://schemas.openxmlformats.org/officeDocument/2006/relationships" xmlns:p="http://schemas.openxmlformats.org/presentationml/2006/main">
+  <p:cSld>
+    <p:spTree>
+      <p:nvGrpSpPr>
+        <p:cNvPr id="1" name=""/>
+        <p:cNvGrpSpPr/>
+        <p:nvPr/>
+      </p:nvGrpSpPr>
+      <p:grpSpPr>
+        <a:xfrm>
+          <a:off x="0" y="0"/>
+          <a:ext cx="0" cy="0"/>
+          <a:chOff x="0" y="0"/>
+          <a:chExt cx="0" cy="0"/>
+        </a:xfrm>
+      </p:grpSpPr>
+      <p:graphicFrame>
+        <p:nvGraphicFramePr>
+          <p:cNvPr id="2" name="Chart 1"/>
+          <p:cNvGraphicFramePr/>
+          <p:nvPr>
+            <p:extLst>
+              <p:ext uri="{D42A27DB-BD31-4B8C-83A1-F6EECF244321}">
+                <p14:modId xmlns:p14="http://schemas.microsoft.com/office/powerpoint/2010/main" val="2508071877"/>
+              </p:ext>
+            </p:extLst>
+          </p:nvPr>
+        </p:nvGraphicFramePr>
+        <p:xfrm>
+          <a:off x="1524000" y="1397000"/>
+          <a:ext cx="6096000" cy="4064000"/>
+        </p:xfrm>
+        <a:graphic>
+          <a:graphicData uri="http://schemas.openxmlformats.org/drawingml/2006/chart">
+            <c:chart xmlns:c="http://schemas.openxmlformats.org/drawingml/2006/chart" xmlns:r="http://schemas.openxmlformats.org/officeDocument/2006/relationships" r:id="rId2"/>
+          </a:graphicData>
+        </a:graphic>
+      </p:graphicFrame>
+    </p:spTree>
+    <p:extLst>
+      <p:ext uri="{BB962C8B-B14F-4D97-AF65-F5344CB8AC3E}">
+        <p14:creationId xmlns:p14="http://schemas.microsoft.com/office/powerpoint/2010/main" val="3780113739"/>
       </p:ext>
     </p:extLst>
   </p:cSld>

</xml_diff>